<commit_message>
fixed typing mistake on pptx
</commit_message>
<xml_diff>
--- a/Transkripcija videa.pptx
+++ b/Transkripcija videa.pptx
@@ -309,7 +309,7 @@
           <a:p>
             <a:fld id="{5FEA125F-8239-4DB4-A7DC-AA07E5FA0C41}" type="datetimeFigureOut">
               <a:rPr lang="en-US" smtClean="0"/>
-              <a:t>10/17/2025</a:t>
+              <a:t>10/18/2025</a:t>
             </a:fld>
             <a:endParaRPr lang="en-US"/>
           </a:p>
@@ -647,7 +647,7 @@
           <a:p>
             <a:fld id="{5FEA125F-8239-4DB4-A7DC-AA07E5FA0C41}" type="datetimeFigureOut">
               <a:rPr lang="en-US" smtClean="0"/>
-              <a:t>10/17/2025</a:t>
+              <a:t>10/18/2025</a:t>
             </a:fld>
             <a:endParaRPr lang="en-US"/>
           </a:p>
@@ -1048,7 +1048,7 @@
           <a:p>
             <a:fld id="{5FEA125F-8239-4DB4-A7DC-AA07E5FA0C41}" type="datetimeFigureOut">
               <a:rPr lang="en-US" smtClean="0"/>
-              <a:t>10/17/2025</a:t>
+              <a:t>10/18/2025</a:t>
             </a:fld>
             <a:endParaRPr lang="en-US"/>
           </a:p>
@@ -1384,7 +1384,7 @@
           <a:p>
             <a:fld id="{5FEA125F-8239-4DB4-A7DC-AA07E5FA0C41}" type="datetimeFigureOut">
               <a:rPr lang="en-US" smtClean="0"/>
-              <a:t>10/17/2025</a:t>
+              <a:t>10/18/2025</a:t>
             </a:fld>
             <a:endParaRPr lang="en-US"/>
           </a:p>
@@ -1704,7 +1704,7 @@
           <a:p>
             <a:fld id="{5FEA125F-8239-4DB4-A7DC-AA07E5FA0C41}" type="datetimeFigureOut">
               <a:rPr lang="en-US" smtClean="0"/>
-              <a:t>10/17/2025</a:t>
+              <a:t>10/18/2025</a:t>
             </a:fld>
             <a:endParaRPr lang="en-US"/>
           </a:p>
@@ -2100,7 +2100,7 @@
           <a:p>
             <a:fld id="{5FEA125F-8239-4DB4-A7DC-AA07E5FA0C41}" type="datetimeFigureOut">
               <a:rPr lang="en-US" smtClean="0"/>
-              <a:t>10/17/2025</a:t>
+              <a:t>10/18/2025</a:t>
             </a:fld>
             <a:endParaRPr lang="en-US"/>
           </a:p>
@@ -2357,7 +2357,7 @@
           <a:p>
             <a:fld id="{5FEA125F-8239-4DB4-A7DC-AA07E5FA0C41}" type="datetimeFigureOut">
               <a:rPr lang="en-US" smtClean="0"/>
-              <a:t>10/17/2025</a:t>
+              <a:t>10/18/2025</a:t>
             </a:fld>
             <a:endParaRPr lang="en-US"/>
           </a:p>
@@ -2619,7 +2619,7 @@
           <a:p>
             <a:fld id="{5FEA125F-8239-4DB4-A7DC-AA07E5FA0C41}" type="datetimeFigureOut">
               <a:rPr lang="en-US" smtClean="0"/>
-              <a:t>10/17/2025</a:t>
+              <a:t>10/18/2025</a:t>
             </a:fld>
             <a:endParaRPr lang="en-US"/>
           </a:p>
@@ -2881,7 +2881,7 @@
           <a:p>
             <a:fld id="{5FEA125F-8239-4DB4-A7DC-AA07E5FA0C41}" type="datetimeFigureOut">
               <a:rPr lang="en-US" smtClean="0"/>
-              <a:t>10/17/2025</a:t>
+              <a:t>10/18/2025</a:t>
             </a:fld>
             <a:endParaRPr lang="en-US"/>
           </a:p>
@@ -3210,7 +3210,7 @@
           <a:p>
             <a:fld id="{5FEA125F-8239-4DB4-A7DC-AA07E5FA0C41}" type="datetimeFigureOut">
               <a:rPr lang="en-US" smtClean="0"/>
-              <a:t>10/17/2025</a:t>
+              <a:t>10/18/2025</a:t>
             </a:fld>
             <a:endParaRPr lang="en-US"/>
           </a:p>
@@ -3533,7 +3533,7 @@
           <a:p>
             <a:fld id="{5FEA125F-8239-4DB4-A7DC-AA07E5FA0C41}" type="datetimeFigureOut">
               <a:rPr lang="en-US" smtClean="0"/>
-              <a:t>10/17/2025</a:t>
+              <a:t>10/18/2025</a:t>
             </a:fld>
             <a:endParaRPr lang="en-US"/>
           </a:p>
@@ -3990,7 +3990,7 @@
           <a:p>
             <a:fld id="{5FEA125F-8239-4DB4-A7DC-AA07E5FA0C41}" type="datetimeFigureOut">
               <a:rPr lang="en-US" smtClean="0"/>
-              <a:t>10/17/2025</a:t>
+              <a:t>10/18/2025</a:t>
             </a:fld>
             <a:endParaRPr lang="en-US"/>
           </a:p>
@@ -4195,7 +4195,7 @@
           <a:p>
             <a:fld id="{5FEA125F-8239-4DB4-A7DC-AA07E5FA0C41}" type="datetimeFigureOut">
               <a:rPr lang="en-US" smtClean="0"/>
-              <a:t>10/17/2025</a:t>
+              <a:t>10/18/2025</a:t>
             </a:fld>
             <a:endParaRPr lang="en-US"/>
           </a:p>
@@ -4372,7 +4372,7 @@
           <a:p>
             <a:fld id="{5FEA125F-8239-4DB4-A7DC-AA07E5FA0C41}" type="datetimeFigureOut">
               <a:rPr lang="en-US" smtClean="0"/>
-              <a:t>10/17/2025</a:t>
+              <a:t>10/18/2025</a:t>
             </a:fld>
             <a:endParaRPr lang="en-US"/>
           </a:p>
@@ -4705,7 +4705,7 @@
           <a:p>
             <a:fld id="{5FEA125F-8239-4DB4-A7DC-AA07E5FA0C41}" type="datetimeFigureOut">
               <a:rPr lang="en-US" smtClean="0"/>
-              <a:t>10/17/2025</a:t>
+              <a:t>10/18/2025</a:t>
             </a:fld>
             <a:endParaRPr lang="en-US"/>
           </a:p>
@@ -5050,7 +5050,7 @@
           <a:p>
             <a:fld id="{5FEA125F-8239-4DB4-A7DC-AA07E5FA0C41}" type="datetimeFigureOut">
               <a:rPr lang="en-US" smtClean="0"/>
-              <a:t>10/17/2025</a:t>
+              <a:t>10/18/2025</a:t>
             </a:fld>
             <a:endParaRPr lang="en-US"/>
           </a:p>
@@ -7167,7 +7167,7 @@
           <a:p>
             <a:fld id="{5FEA125F-8239-4DB4-A7DC-AA07E5FA0C41}" type="datetimeFigureOut">
               <a:rPr lang="en-US" smtClean="0"/>
-              <a:t>10/17/2025</a:t>
+              <a:t>10/18/2025</a:t>
             </a:fld>
             <a:endParaRPr lang="en-US"/>
           </a:p>
@@ -8848,11 +8848,15 @@
             </a:r>
             <a:r>
               <a:rPr lang="en-US" dirty="0" err="1"/>
-              <a:t>pomo’u</a:t>
+              <a:t>pomo</a:t>
+            </a:r>
+            <a:r>
+              <a:rPr lang="sr-Latn-RS" dirty="0"/>
+              <a:t>ć</a:t>
             </a:r>
             <a:r>
               <a:rPr lang="en-US" dirty="0"/>
-              <a:t> </a:t>
+              <a:t>u </a:t>
             </a:r>
             <a:r>
               <a:rPr lang="en-US" dirty="0" err="1"/>

</xml_diff>